<commit_message>
Updates for clarity on current real-time ADS oriented operations.
git-svn-id: http://svn.eol.ucar.edu/svn/raf/trunk/instruments/mtp@8262 640d5228-2204-0410-8d71-8f46fa6850b4
</commit_message>
<xml_diff>
--- a/doc/MTP_OPS_20150902.pptx
+++ b/doc/MTP_OPS_20150902.pptx
@@ -3193,6 +3193,13 @@
   <p:clrMapOvr>
     <a:masterClrMapping/>
   </p:clrMapOvr>
+  <p:timing>
+    <p:tnLst>
+      <p:par>
+        <p:cTn id="1" dur="indefinite" restart="never" nodeType="tmRoot"/>
+      </p:par>
+    </p:tnLst>
+  </p:timing>
 </p:sld>
 </file>
 
@@ -3963,7 +3970,11 @@
             <a:pPr algn="ctr"/>
             <a:r>
               <a:rPr lang="en-US" dirty="0" smtClean="0"/>
-              <a:t>Archive Average Brightness Temps</a:t>
+              <a:t>Archive Average Brightness </a:t>
+            </a:r>
+            <a:r>
+              <a:rPr lang="en-US" dirty="0" smtClean="0"/>
+              <a:t>Temps</a:t>
             </a:r>
             <a:endParaRPr lang="en-US" dirty="0"/>
           </a:p>
@@ -4419,6 +4430,7 @@
             <a:avLst/>
           </a:prstGeom>
           <a:ln w="31750">
+            <a:headEnd type="arrow"/>
             <a:tailEnd type="arrow"/>
           </a:ln>
         </p:spPr>
@@ -5703,21 +5715,18 @@
       <p:cxnSp>
         <p:nvCxnSpPr>
           <p:cNvPr id="24" name="Straight Arrow Connector 23"/>
-          <p:cNvCxnSpPr>
-            <a:stCxn id="7" idx="3"/>
-            <a:endCxn id="18" idx="0"/>
-          </p:cNvCxnSpPr>
+          <p:cNvCxnSpPr/>
           <p:nvPr/>
         </p:nvCxnSpPr>
         <p:spPr>
           <a:xfrm flipV="1">
-            <a:off x="3050043" y="1524000"/>
+            <a:off x="3093462" y="1524000"/>
             <a:ext cx="3307338" cy="2770197"/>
           </a:xfrm>
           <a:prstGeom prst="straightConnector1">
             <a:avLst/>
           </a:prstGeom>
-          <a:ln w="31750">
+          <a:ln w="6350">
             <a:tailEnd type="arrow"/>
           </a:ln>
         </p:spPr>
@@ -6128,6 +6137,13 @@
   <p:clrMapOvr>
     <a:masterClrMapping/>
   </p:clrMapOvr>
+  <p:timing>
+    <p:tnLst>
+      <p:par>
+        <p:cTn id="1" dur="indefinite" restart="never" nodeType="tmRoot"/>
+      </p:par>
+    </p:tnLst>
+  </p:timing>
 </p:sld>
 </file>
 
@@ -6156,7 +6172,7 @@
         </p:nvSpPr>
         <p:spPr>
           <a:xfrm>
-            <a:off x="0" y="0"/>
+            <a:off x="-76200" y="0"/>
             <a:ext cx="7049902" cy="6629400"/>
           </a:xfrm>
           <a:prstGeom prst="rect">
@@ -6206,7 +6222,7 @@
         </p:nvSpPr>
         <p:spPr>
           <a:xfrm>
-            <a:off x="1093006" y="457200"/>
+            <a:off x="886826" y="228600"/>
             <a:ext cx="5276249" cy="1143000"/>
           </a:xfrm>
           <a:ln w="3175">
@@ -6440,7 +6456,7 @@
         <p:nvCxnSpPr>
           <p:cNvPr id="33" name="Straight Arrow Connector 32"/>
           <p:cNvCxnSpPr>
-            <a:stCxn id="29" idx="5"/>
+            <a:stCxn id="29" idx="7"/>
             <a:endCxn id="28" idx="3"/>
           </p:cNvCxnSpPr>
           <p:nvPr/>
@@ -6448,7 +6464,7 @@
         <p:spPr>
           <a:xfrm flipV="1">
             <a:off x="3434415" y="2290841"/>
-            <a:ext cx="845858" cy="896485"/>
+            <a:ext cx="845858" cy="465433"/>
           </a:xfrm>
           <a:prstGeom prst="straightConnector1">
             <a:avLst/>
@@ -7025,6 +7041,92 @@
           </a:p>
         </p:txBody>
       </p:sp>
+      <p:sp>
+        <p:nvSpPr>
+          <p:cNvPr id="72" name="Rectangle 71"/>
+          <p:cNvSpPr/>
+          <p:nvPr/>
+        </p:nvSpPr>
+        <p:spPr>
+          <a:xfrm>
+            <a:off x="2808647" y="4086231"/>
+            <a:ext cx="1219200" cy="762000"/>
+          </a:xfrm>
+          <a:prstGeom prst="rect">
+            <a:avLst/>
+          </a:prstGeom>
+          <a:solidFill>
+            <a:schemeClr val="accent3">
+              <a:lumMod val="75000"/>
+            </a:schemeClr>
+          </a:solidFill>
+        </p:spPr>
+        <p:style>
+          <a:lnRef idx="2">
+            <a:schemeClr val="accent1">
+              <a:shade val="50000"/>
+            </a:schemeClr>
+          </a:lnRef>
+          <a:fillRef idx="1">
+            <a:schemeClr val="accent1"/>
+          </a:fillRef>
+          <a:effectRef idx="0">
+            <a:schemeClr val="accent1"/>
+          </a:effectRef>
+          <a:fontRef idx="minor">
+            <a:schemeClr val="lt1"/>
+          </a:fontRef>
+        </p:style>
+        <p:txBody>
+          <a:bodyPr rtlCol="0" anchor="ctr"/>
+          <a:lstStyle/>
+          <a:p>
+            <a:pPr algn="ctr"/>
+            <a:r>
+              <a:rPr lang="en-US" dirty="0" smtClean="0"/>
+              <a:t>ADS File</a:t>
+            </a:r>
+            <a:endParaRPr lang="en-US" dirty="0"/>
+          </a:p>
+        </p:txBody>
+      </p:sp>
+      <p:cxnSp>
+        <p:nvCxnSpPr>
+          <p:cNvPr id="73" name="Straight Arrow Connector 72"/>
+          <p:cNvCxnSpPr>
+            <a:stCxn id="72" idx="0"/>
+            <a:endCxn id="28" idx="4"/>
+          </p:cNvCxnSpPr>
+          <p:nvPr/>
+        </p:nvCxnSpPr>
+        <p:spPr>
+          <a:xfrm flipV="1">
+            <a:off x="3418247" y="2380115"/>
+            <a:ext cx="1400841" cy="1706116"/>
+          </a:xfrm>
+          <a:prstGeom prst="straightConnector1">
+            <a:avLst/>
+          </a:prstGeom>
+          <a:ln w="31750">
+            <a:headEnd type="arrow"/>
+            <a:tailEnd type="none"/>
+          </a:ln>
+        </p:spPr>
+        <p:style>
+          <a:lnRef idx="1">
+            <a:schemeClr val="accent1"/>
+          </a:lnRef>
+          <a:fillRef idx="0">
+            <a:schemeClr val="accent1"/>
+          </a:fillRef>
+          <a:effectRef idx="0">
+            <a:schemeClr val="accent1"/>
+          </a:effectRef>
+          <a:fontRef idx="minor">
+            <a:schemeClr val="tx1"/>
+          </a:fontRef>
+        </p:style>
+      </p:cxnSp>
     </p:spTree>
     <p:extLst>
       <p:ext uri="{BB962C8B-B14F-4D97-AF65-F5344CB8AC3E}">
@@ -7035,6 +7137,13 @@
   <p:clrMapOvr>
     <a:masterClrMapping/>
   </p:clrMapOvr>
+  <p:timing>
+    <p:tnLst>
+      <p:par>
+        <p:cTn id="1" dur="indefinite" restart="never" nodeType="tmRoot"/>
+      </p:par>
+    </p:tnLst>
+  </p:timing>
 </p:sld>
 </file>
 

</xml_diff>